<commit_message>
update Health_Info_Presentation.pptx with latest content
</commit_message>
<xml_diff>
--- a/Health_Info_Presentation.pptx
+++ b/Health_Info_Presentation.pptx
@@ -167,10 +167,9 @@
           <a:lstStyle/>
           <a:p>
             <a:r>
-              <a:rPr lang="en-US" smtClean="0"/>
+              <a:rPr lang="en-US"/>
               <a:t>Click to edit Master title style</a:t>
             </a:r>
-            <a:endParaRPr lang="en-US"/>
           </a:p>
         </p:txBody>
       </p:sp>
@@ -286,10 +285,9 @@
           </a:lstStyle>
           <a:p>
             <a:r>
-              <a:rPr lang="en-US" smtClean="0"/>
+              <a:rPr lang="en-US"/>
               <a:t>Click to edit Master subtitle style</a:t>
             </a:r>
-            <a:endParaRPr lang="en-US"/>
           </a:p>
         </p:txBody>
       </p:sp>
@@ -310,7 +308,7 @@
           <a:p>
             <a:fld id="{5BCAD085-E8A6-8845-BD4E-CB4CCA059FC4}" type="datetimeFigureOut">
               <a:rPr lang="en-US" smtClean="0"/>
-              <a:t>27-Apr-25</a:t>
+              <a:t>9/15/2025</a:t>
             </a:fld>
             <a:endParaRPr lang="en-US"/>
           </a:p>
@@ -404,10 +402,9 @@
           <a:lstStyle/>
           <a:p>
             <a:r>
-              <a:rPr lang="en-US" smtClean="0"/>
+              <a:rPr lang="en-US"/>
               <a:t>Click to edit Master title style</a:t>
             </a:r>
-            <a:endParaRPr lang="en-US"/>
           </a:p>
         </p:txBody>
       </p:sp>
@@ -428,38 +425,37 @@
           <a:p>
             <a:pPr lvl="0"/>
             <a:r>
-              <a:rPr lang="en-US" smtClean="0"/>
+              <a:rPr lang="en-US"/>
               <a:t>Click to edit Master text styles</a:t>
             </a:r>
           </a:p>
           <a:p>
             <a:pPr lvl="1"/>
             <a:r>
-              <a:rPr lang="en-US" smtClean="0"/>
+              <a:rPr lang="en-US"/>
               <a:t>Second level</a:t>
             </a:r>
           </a:p>
           <a:p>
             <a:pPr lvl="2"/>
             <a:r>
-              <a:rPr lang="en-US" smtClean="0"/>
+              <a:rPr lang="en-US"/>
               <a:t>Third level</a:t>
             </a:r>
           </a:p>
           <a:p>
             <a:pPr lvl="3"/>
             <a:r>
-              <a:rPr lang="en-US" smtClean="0"/>
+              <a:rPr lang="en-US"/>
               <a:t>Fourth level</a:t>
             </a:r>
           </a:p>
           <a:p>
             <a:pPr lvl="4"/>
             <a:r>
-              <a:rPr lang="en-US" smtClean="0"/>
+              <a:rPr lang="en-US"/>
               <a:t>Fifth level</a:t>
             </a:r>
-            <a:endParaRPr lang="en-US"/>
           </a:p>
         </p:txBody>
       </p:sp>
@@ -480,7 +476,7 @@
           <a:p>
             <a:fld id="{5BCAD085-E8A6-8845-BD4E-CB4CCA059FC4}" type="datetimeFigureOut">
               <a:rPr lang="en-US" smtClean="0"/>
-              <a:t>27-Apr-25</a:t>
+              <a:t>9/15/2025</a:t>
             </a:fld>
             <a:endParaRPr lang="en-US"/>
           </a:p>
@@ -579,10 +575,9 @@
           <a:lstStyle/>
           <a:p>
             <a:r>
-              <a:rPr lang="en-US" smtClean="0"/>
+              <a:rPr lang="en-US"/>
               <a:t>Click to edit Master title style</a:t>
             </a:r>
-            <a:endParaRPr lang="en-US"/>
           </a:p>
         </p:txBody>
       </p:sp>
@@ -608,38 +603,37 @@
           <a:p>
             <a:pPr lvl="0"/>
             <a:r>
-              <a:rPr lang="en-US" smtClean="0"/>
+              <a:rPr lang="en-US"/>
               <a:t>Click to edit Master text styles</a:t>
             </a:r>
           </a:p>
           <a:p>
             <a:pPr lvl="1"/>
             <a:r>
-              <a:rPr lang="en-US" smtClean="0"/>
+              <a:rPr lang="en-US"/>
               <a:t>Second level</a:t>
             </a:r>
           </a:p>
           <a:p>
             <a:pPr lvl="2"/>
             <a:r>
-              <a:rPr lang="en-US" smtClean="0"/>
+              <a:rPr lang="en-US"/>
               <a:t>Third level</a:t>
             </a:r>
           </a:p>
           <a:p>
             <a:pPr lvl="3"/>
             <a:r>
-              <a:rPr lang="en-US" smtClean="0"/>
+              <a:rPr lang="en-US"/>
               <a:t>Fourth level</a:t>
             </a:r>
           </a:p>
           <a:p>
             <a:pPr lvl="4"/>
             <a:r>
-              <a:rPr lang="en-US" smtClean="0"/>
+              <a:rPr lang="en-US"/>
               <a:t>Fifth level</a:t>
             </a:r>
-            <a:endParaRPr lang="en-US"/>
           </a:p>
         </p:txBody>
       </p:sp>
@@ -660,7 +654,7 @@
           <a:p>
             <a:fld id="{5BCAD085-E8A6-8845-BD4E-CB4CCA059FC4}" type="datetimeFigureOut">
               <a:rPr lang="en-US" smtClean="0"/>
-              <a:t>27-Apr-25</a:t>
+              <a:t>9/15/2025</a:t>
             </a:fld>
             <a:endParaRPr lang="en-US"/>
           </a:p>
@@ -754,10 +748,9 @@
           <a:lstStyle/>
           <a:p>
             <a:r>
-              <a:rPr lang="en-US" smtClean="0"/>
+              <a:rPr lang="en-US"/>
               <a:t>Click to edit Master title style</a:t>
             </a:r>
-            <a:endParaRPr lang="en-US"/>
           </a:p>
         </p:txBody>
       </p:sp>
@@ -778,38 +771,37 @@
           <a:p>
             <a:pPr lvl="0"/>
             <a:r>
-              <a:rPr lang="en-US" smtClean="0"/>
+              <a:rPr lang="en-US"/>
               <a:t>Click to edit Master text styles</a:t>
             </a:r>
           </a:p>
           <a:p>
             <a:pPr lvl="1"/>
             <a:r>
-              <a:rPr lang="en-US" smtClean="0"/>
+              <a:rPr lang="en-US"/>
               <a:t>Second level</a:t>
             </a:r>
           </a:p>
           <a:p>
             <a:pPr lvl="2"/>
             <a:r>
-              <a:rPr lang="en-US" smtClean="0"/>
+              <a:rPr lang="en-US"/>
               <a:t>Third level</a:t>
             </a:r>
           </a:p>
           <a:p>
             <a:pPr lvl="3"/>
             <a:r>
-              <a:rPr lang="en-US" smtClean="0"/>
+              <a:rPr lang="en-US"/>
               <a:t>Fourth level</a:t>
             </a:r>
           </a:p>
           <a:p>
             <a:pPr lvl="4"/>
             <a:r>
-              <a:rPr lang="en-US" smtClean="0"/>
+              <a:rPr lang="en-US"/>
               <a:t>Fifth level</a:t>
             </a:r>
-            <a:endParaRPr lang="en-US"/>
           </a:p>
         </p:txBody>
       </p:sp>
@@ -830,7 +822,7 @@
           <a:p>
             <a:fld id="{5BCAD085-E8A6-8845-BD4E-CB4CCA059FC4}" type="datetimeFigureOut">
               <a:rPr lang="en-US" smtClean="0"/>
-              <a:t>27-Apr-25</a:t>
+              <a:t>9/15/2025</a:t>
             </a:fld>
             <a:endParaRPr lang="en-US"/>
           </a:p>
@@ -933,10 +925,9 @@
           </a:lstStyle>
           <a:p>
             <a:r>
-              <a:rPr lang="en-US" smtClean="0"/>
+              <a:rPr lang="en-US"/>
               <a:t>Click to edit Master title style</a:t>
             </a:r>
-            <a:endParaRPr lang="en-US"/>
           </a:p>
         </p:txBody>
       </p:sp>
@@ -1053,7 +1044,7 @@
           <a:p>
             <a:pPr lvl="0"/>
             <a:r>
-              <a:rPr lang="en-US" smtClean="0"/>
+              <a:rPr lang="en-US"/>
               <a:t>Click to edit Master text styles</a:t>
             </a:r>
           </a:p>
@@ -1076,7 +1067,7 @@
           <a:p>
             <a:fld id="{5BCAD085-E8A6-8845-BD4E-CB4CCA059FC4}" type="datetimeFigureOut">
               <a:rPr lang="en-US" smtClean="0"/>
-              <a:t>27-Apr-25</a:t>
+              <a:t>9/15/2025</a:t>
             </a:fld>
             <a:endParaRPr lang="en-US"/>
           </a:p>
@@ -1170,10 +1161,9 @@
           <a:lstStyle/>
           <a:p>
             <a:r>
-              <a:rPr lang="en-US" smtClean="0"/>
+              <a:rPr lang="en-US"/>
               <a:t>Click to edit Master title style</a:t>
             </a:r>
-            <a:endParaRPr lang="en-US"/>
           </a:p>
         </p:txBody>
       </p:sp>
@@ -1227,38 +1217,37 @@
           <a:p>
             <a:pPr lvl="0"/>
             <a:r>
-              <a:rPr lang="en-US" smtClean="0"/>
+              <a:rPr lang="en-US"/>
               <a:t>Click to edit Master text styles</a:t>
             </a:r>
           </a:p>
           <a:p>
             <a:pPr lvl="1"/>
             <a:r>
-              <a:rPr lang="en-US" smtClean="0"/>
+              <a:rPr lang="en-US"/>
               <a:t>Second level</a:t>
             </a:r>
           </a:p>
           <a:p>
             <a:pPr lvl="2"/>
             <a:r>
-              <a:rPr lang="en-US" smtClean="0"/>
+              <a:rPr lang="en-US"/>
               <a:t>Third level</a:t>
             </a:r>
           </a:p>
           <a:p>
             <a:pPr lvl="3"/>
             <a:r>
-              <a:rPr lang="en-US" smtClean="0"/>
+              <a:rPr lang="en-US"/>
               <a:t>Fourth level</a:t>
             </a:r>
           </a:p>
           <a:p>
             <a:pPr lvl="4"/>
             <a:r>
-              <a:rPr lang="en-US" smtClean="0"/>
+              <a:rPr lang="en-US"/>
               <a:t>Fifth level</a:t>
             </a:r>
-            <a:endParaRPr lang="en-US"/>
           </a:p>
         </p:txBody>
       </p:sp>
@@ -1312,38 +1301,37 @@
           <a:p>
             <a:pPr lvl="0"/>
             <a:r>
-              <a:rPr lang="en-US" smtClean="0"/>
+              <a:rPr lang="en-US"/>
               <a:t>Click to edit Master text styles</a:t>
             </a:r>
           </a:p>
           <a:p>
             <a:pPr lvl="1"/>
             <a:r>
-              <a:rPr lang="en-US" smtClean="0"/>
+              <a:rPr lang="en-US"/>
               <a:t>Second level</a:t>
             </a:r>
           </a:p>
           <a:p>
             <a:pPr lvl="2"/>
             <a:r>
-              <a:rPr lang="en-US" smtClean="0"/>
+              <a:rPr lang="en-US"/>
               <a:t>Third level</a:t>
             </a:r>
           </a:p>
           <a:p>
             <a:pPr lvl="3"/>
             <a:r>
-              <a:rPr lang="en-US" smtClean="0"/>
+              <a:rPr lang="en-US"/>
               <a:t>Fourth level</a:t>
             </a:r>
           </a:p>
           <a:p>
             <a:pPr lvl="4"/>
             <a:r>
-              <a:rPr lang="en-US" smtClean="0"/>
+              <a:rPr lang="en-US"/>
               <a:t>Fifth level</a:t>
             </a:r>
-            <a:endParaRPr lang="en-US"/>
           </a:p>
         </p:txBody>
       </p:sp>
@@ -1364,7 +1352,7 @@
           <a:p>
             <a:fld id="{5BCAD085-E8A6-8845-BD4E-CB4CCA059FC4}" type="datetimeFigureOut">
               <a:rPr lang="en-US" smtClean="0"/>
-              <a:t>27-Apr-25</a:t>
+              <a:t>9/15/2025</a:t>
             </a:fld>
             <a:endParaRPr lang="en-US"/>
           </a:p>
@@ -1462,10 +1450,9 @@
           </a:lstStyle>
           <a:p>
             <a:r>
-              <a:rPr lang="en-US" smtClean="0"/>
+              <a:rPr lang="en-US"/>
               <a:t>Click to edit Master title style</a:t>
             </a:r>
-            <a:endParaRPr lang="en-US"/>
           </a:p>
         </p:txBody>
       </p:sp>
@@ -1528,7 +1515,7 @@
           <a:p>
             <a:pPr lvl="0"/>
             <a:r>
-              <a:rPr lang="en-US" smtClean="0"/>
+              <a:rPr lang="en-US"/>
               <a:t>Click to edit Master text styles</a:t>
             </a:r>
           </a:p>
@@ -1584,38 +1571,37 @@
           <a:p>
             <a:pPr lvl="0"/>
             <a:r>
-              <a:rPr lang="en-US" smtClean="0"/>
+              <a:rPr lang="en-US"/>
               <a:t>Click to edit Master text styles</a:t>
             </a:r>
           </a:p>
           <a:p>
             <a:pPr lvl="1"/>
             <a:r>
-              <a:rPr lang="en-US" smtClean="0"/>
+              <a:rPr lang="en-US"/>
               <a:t>Second level</a:t>
             </a:r>
           </a:p>
           <a:p>
             <a:pPr lvl="2"/>
             <a:r>
-              <a:rPr lang="en-US" smtClean="0"/>
+              <a:rPr lang="en-US"/>
               <a:t>Third level</a:t>
             </a:r>
           </a:p>
           <a:p>
             <a:pPr lvl="3"/>
             <a:r>
-              <a:rPr lang="en-US" smtClean="0"/>
+              <a:rPr lang="en-US"/>
               <a:t>Fourth level</a:t>
             </a:r>
           </a:p>
           <a:p>
             <a:pPr lvl="4"/>
             <a:r>
-              <a:rPr lang="en-US" smtClean="0"/>
+              <a:rPr lang="en-US"/>
               <a:t>Fifth level</a:t>
             </a:r>
-            <a:endParaRPr lang="en-US"/>
           </a:p>
         </p:txBody>
       </p:sp>
@@ -1678,7 +1664,7 @@
           <a:p>
             <a:pPr lvl="0"/>
             <a:r>
-              <a:rPr lang="en-US" smtClean="0"/>
+              <a:rPr lang="en-US"/>
               <a:t>Click to edit Master text styles</a:t>
             </a:r>
           </a:p>
@@ -1734,38 +1720,37 @@
           <a:p>
             <a:pPr lvl="0"/>
             <a:r>
-              <a:rPr lang="en-US" smtClean="0"/>
+              <a:rPr lang="en-US"/>
               <a:t>Click to edit Master text styles</a:t>
             </a:r>
           </a:p>
           <a:p>
             <a:pPr lvl="1"/>
             <a:r>
-              <a:rPr lang="en-US" smtClean="0"/>
+              <a:rPr lang="en-US"/>
               <a:t>Second level</a:t>
             </a:r>
           </a:p>
           <a:p>
             <a:pPr lvl="2"/>
             <a:r>
-              <a:rPr lang="en-US" smtClean="0"/>
+              <a:rPr lang="en-US"/>
               <a:t>Third level</a:t>
             </a:r>
           </a:p>
           <a:p>
             <a:pPr lvl="3"/>
             <a:r>
-              <a:rPr lang="en-US" smtClean="0"/>
+              <a:rPr lang="en-US"/>
               <a:t>Fourth level</a:t>
             </a:r>
           </a:p>
           <a:p>
             <a:pPr lvl="4"/>
             <a:r>
-              <a:rPr lang="en-US" smtClean="0"/>
+              <a:rPr lang="en-US"/>
               <a:t>Fifth level</a:t>
             </a:r>
-            <a:endParaRPr lang="en-US"/>
           </a:p>
         </p:txBody>
       </p:sp>
@@ -1786,7 +1771,7 @@
           <a:p>
             <a:fld id="{5BCAD085-E8A6-8845-BD4E-CB4CCA059FC4}" type="datetimeFigureOut">
               <a:rPr lang="en-US" smtClean="0"/>
-              <a:t>27-Apr-25</a:t>
+              <a:t>9/15/2025</a:t>
             </a:fld>
             <a:endParaRPr lang="en-US"/>
           </a:p>
@@ -1880,10 +1865,9 @@
           <a:lstStyle/>
           <a:p>
             <a:r>
-              <a:rPr lang="en-US" smtClean="0"/>
+              <a:rPr lang="en-US"/>
               <a:t>Click to edit Master title style</a:t>
             </a:r>
-            <a:endParaRPr lang="en-US"/>
           </a:p>
         </p:txBody>
       </p:sp>
@@ -1904,7 +1888,7 @@
           <a:p>
             <a:fld id="{5BCAD085-E8A6-8845-BD4E-CB4CCA059FC4}" type="datetimeFigureOut">
               <a:rPr lang="en-US" smtClean="0"/>
-              <a:t>27-Apr-25</a:t>
+              <a:t>9/15/2025</a:t>
             </a:fld>
             <a:endParaRPr lang="en-US"/>
           </a:p>
@@ -1999,7 +1983,7 @@
           <a:p>
             <a:fld id="{5BCAD085-E8A6-8845-BD4E-CB4CCA059FC4}" type="datetimeFigureOut">
               <a:rPr lang="en-US" smtClean="0"/>
-              <a:t>27-Apr-25</a:t>
+              <a:t>9/15/2025</a:t>
             </a:fld>
             <a:endParaRPr lang="en-US"/>
           </a:p>
@@ -2102,10 +2086,9 @@
           </a:lstStyle>
           <a:p>
             <a:r>
-              <a:rPr lang="en-US" smtClean="0"/>
+              <a:rPr lang="en-US"/>
               <a:t>Click to edit Master title style</a:t>
             </a:r>
-            <a:endParaRPr lang="en-US"/>
           </a:p>
         </p:txBody>
       </p:sp>
@@ -2159,38 +2142,37 @@
           <a:p>
             <a:pPr lvl="0"/>
             <a:r>
-              <a:rPr lang="en-US" smtClean="0"/>
+              <a:rPr lang="en-US"/>
               <a:t>Click to edit Master text styles</a:t>
             </a:r>
           </a:p>
           <a:p>
             <a:pPr lvl="1"/>
             <a:r>
-              <a:rPr lang="en-US" smtClean="0"/>
+              <a:rPr lang="en-US"/>
               <a:t>Second level</a:t>
             </a:r>
           </a:p>
           <a:p>
             <a:pPr lvl="2"/>
             <a:r>
-              <a:rPr lang="en-US" smtClean="0"/>
+              <a:rPr lang="en-US"/>
               <a:t>Third level</a:t>
             </a:r>
           </a:p>
           <a:p>
             <a:pPr lvl="3"/>
             <a:r>
-              <a:rPr lang="en-US" smtClean="0"/>
+              <a:rPr lang="en-US"/>
               <a:t>Fourth level</a:t>
             </a:r>
           </a:p>
           <a:p>
             <a:pPr lvl="4"/>
             <a:r>
-              <a:rPr lang="en-US" smtClean="0"/>
+              <a:rPr lang="en-US"/>
               <a:t>Fifth level</a:t>
             </a:r>
-            <a:endParaRPr lang="en-US"/>
           </a:p>
         </p:txBody>
       </p:sp>
@@ -2253,7 +2235,7 @@
           <a:p>
             <a:pPr lvl="0"/>
             <a:r>
-              <a:rPr lang="en-US" smtClean="0"/>
+              <a:rPr lang="en-US"/>
               <a:t>Click to edit Master text styles</a:t>
             </a:r>
           </a:p>
@@ -2276,7 +2258,7 @@
           <a:p>
             <a:fld id="{5BCAD085-E8A6-8845-BD4E-CB4CCA059FC4}" type="datetimeFigureOut">
               <a:rPr lang="en-US" smtClean="0"/>
-              <a:t>27-Apr-25</a:t>
+              <a:t>9/15/2025</a:t>
             </a:fld>
             <a:endParaRPr lang="en-US"/>
           </a:p>
@@ -2379,10 +2361,9 @@
           </a:lstStyle>
           <a:p>
             <a:r>
-              <a:rPr lang="en-US" smtClean="0"/>
+              <a:rPr lang="en-US"/>
               <a:t>Click to edit Master title style</a:t>
             </a:r>
-            <a:endParaRPr lang="en-US"/>
           </a:p>
         </p:txBody>
       </p:sp>
@@ -2506,7 +2487,7 @@
           <a:p>
             <a:pPr lvl="0"/>
             <a:r>
-              <a:rPr lang="en-US" smtClean="0"/>
+              <a:rPr lang="en-US"/>
               <a:t>Click to edit Master text styles</a:t>
             </a:r>
           </a:p>
@@ -2529,7 +2510,7 @@
           <a:p>
             <a:fld id="{5BCAD085-E8A6-8845-BD4E-CB4CCA059FC4}" type="datetimeFigureOut">
               <a:rPr lang="en-US" smtClean="0"/>
-              <a:t>27-Apr-25</a:t>
+              <a:t>9/15/2025</a:t>
             </a:fld>
             <a:endParaRPr lang="en-US"/>
           </a:p>
@@ -2638,10 +2619,9 @@
           <a:lstStyle/>
           <a:p>
             <a:r>
-              <a:rPr lang="en-US" smtClean="0"/>
+              <a:rPr lang="en-US"/>
               <a:t>Click to edit Master title style</a:t>
             </a:r>
-            <a:endParaRPr lang="en-US"/>
           </a:p>
         </p:txBody>
       </p:sp>
@@ -2672,38 +2652,37 @@
           <a:p>
             <a:pPr lvl="0"/>
             <a:r>
-              <a:rPr lang="en-US" smtClean="0"/>
+              <a:rPr lang="en-US"/>
               <a:t>Click to edit Master text styles</a:t>
             </a:r>
           </a:p>
           <a:p>
             <a:pPr lvl="1"/>
             <a:r>
-              <a:rPr lang="en-US" smtClean="0"/>
+              <a:rPr lang="en-US"/>
               <a:t>Second level</a:t>
             </a:r>
           </a:p>
           <a:p>
             <a:pPr lvl="2"/>
             <a:r>
-              <a:rPr lang="en-US" smtClean="0"/>
+              <a:rPr lang="en-US"/>
               <a:t>Third level</a:t>
             </a:r>
           </a:p>
           <a:p>
             <a:pPr lvl="3"/>
             <a:r>
-              <a:rPr lang="en-US" smtClean="0"/>
+              <a:rPr lang="en-US"/>
               <a:t>Fourth level</a:t>
             </a:r>
           </a:p>
           <a:p>
             <a:pPr lvl="4"/>
             <a:r>
-              <a:rPr lang="en-US" smtClean="0"/>
+              <a:rPr lang="en-US"/>
               <a:t>Fifth level</a:t>
             </a:r>
-            <a:endParaRPr lang="en-US"/>
           </a:p>
         </p:txBody>
       </p:sp>
@@ -2742,7 +2721,7 @@
           <a:p>
             <a:fld id="{5BCAD085-E8A6-8845-BD4E-CB4CCA059FC4}" type="datetimeFigureOut">
               <a:rPr lang="en-US" smtClean="0"/>
-              <a:t>27-Apr-25</a:t>
+              <a:t>9/15/2025</a:t>
             </a:fld>
             <a:endParaRPr lang="en-US"/>
           </a:p>
@@ -3179,22 +3158,22 @@
               <a:t>Deployed with Render and </a:t>
             </a:r>
             <a:r>
-              <a:rPr dirty="0" err="1" smtClean="0"/>
+              <a:rPr dirty="0" err="1"/>
               <a:t>Vercel</a:t>
             </a:r>
-            <a:endParaRPr lang="en-US" dirty="0" smtClean="0"/>
-          </a:p>
-          <a:p>
-            <a:r>
-              <a:rPr lang="en-US" dirty="0" smtClean="0"/>
+            <a:endParaRPr lang="en-US" dirty="0"/>
+          </a:p>
+          <a:p>
+            <a:r>
+              <a:rPr lang="en-US" dirty="0"/>
               <a:t>Built by: Jefferson </a:t>
             </a:r>
             <a:r>
-              <a:rPr lang="en-US" dirty="0" err="1" smtClean="0"/>
+              <a:rPr lang="en-US" dirty="0" err="1"/>
               <a:t>Tumuti</a:t>
             </a:r>
             <a:r>
-              <a:rPr lang="en-US" dirty="0" smtClean="0"/>
+              <a:rPr lang="en-US" dirty="0"/>
               <a:t> Wamugi</a:t>
             </a:r>
             <a:endParaRPr dirty="0"/>
@@ -3587,9 +3566,6 @@
               <a:t>PostgreSQL Database (Render Managed DB)</a:t>
             </a:r>
             <a:br/>
-            <a:r>
-              <a:t/>
-            </a:r>
             <a:br/>
             <a:r>
               <a:t>- Frontend calls API using JWT Tokens</a:t>
@@ -3764,10 +3740,6 @@
               </a:rPr>
               <a:t>https://health-info-bice.vercel.app</a:t>
             </a:r>
-            <a:r>
-              <a:rPr dirty="0"/>
-              <a:t/>
-            </a:r>
             <a:br>
               <a:rPr dirty="0"/>
             </a:br>
@@ -3781,17 +3753,9 @@
               </a:rPr>
               <a:t>https://health-info.onrender.com/api</a:t>
             </a:r>
-            <a:r>
-              <a:rPr dirty="0"/>
-              <a:t/>
-            </a:r>
             <a:br>
               <a:rPr dirty="0"/>
             </a:br>
-            <a:r>
-              <a:rPr dirty="0"/>
-              <a:t/>
-            </a:r>
             <a:br>
               <a:rPr dirty="0"/>
             </a:br>
@@ -3807,30 +3771,30 @@
               <a:t>- Email: </a:t>
             </a:r>
             <a:r>
-              <a:rPr lang="en-US" dirty="0" smtClean="0">
+              <a:rPr lang="en-US" dirty="0">
                 <a:hlinkClick r:id="rId4"/>
               </a:rPr>
               <a:t>jefftumuti</a:t>
             </a:r>
             <a:r>
-              <a:rPr dirty="0" smtClean="0">
+              <a:rPr dirty="0">
                 <a:hlinkClick r:id="rId4"/>
               </a:rPr>
               <a:t>@</a:t>
             </a:r>
             <a:r>
-              <a:rPr lang="en-US" dirty="0" smtClean="0">
+              <a:rPr lang="en-US" dirty="0">
                 <a:hlinkClick r:id="rId4"/>
               </a:rPr>
               <a:t>gmail</a:t>
             </a:r>
             <a:r>
-              <a:rPr dirty="0" smtClean="0">
+              <a:rPr dirty="0">
                 <a:hlinkClick r:id="rId4"/>
               </a:rPr>
               <a:t>.com</a:t>
             </a:r>
-            <a:endParaRPr lang="en-US" dirty="0" smtClean="0"/>
+            <a:endParaRPr lang="en-US" dirty="0"/>
           </a:p>
           <a:p>
             <a:pPr marL="0" indent="0">
@@ -3838,7 +3802,7 @@
               <a:defRPr sz="2400"/>
             </a:pPr>
             <a:r>
-              <a:rPr lang="en-US" dirty="0" smtClean="0"/>
+              <a:rPr lang="en-US" dirty="0"/>
               <a:t>Login Credentials (Frontend React):</a:t>
             </a:r>
           </a:p>
@@ -3847,7 +3811,7 @@
               <a:defRPr sz="2400"/>
             </a:pPr>
             <a:r>
-              <a:rPr lang="en-US" dirty="0" smtClean="0"/>
+              <a:rPr lang="en-US" dirty="0"/>
               <a:t>Username: admin</a:t>
             </a:r>
           </a:p>
@@ -3856,7 +3820,7 @@
               <a:defRPr sz="2400"/>
             </a:pPr>
             <a:r>
-              <a:rPr lang="en-US" dirty="0" smtClean="0"/>
+              <a:rPr lang="en-US" dirty="0"/>
               <a:t>Password: adminpassword123</a:t>
             </a:r>
             <a:endParaRPr dirty="0"/>

</xml_diff>

<commit_message>
update Health_Info_Presentation.pptx with new changes
</commit_message>
<xml_diff>
--- a/Health_Info_Presentation.pptx
+++ b/Health_Info_Presentation.pptx
@@ -3821,7 +3821,11 @@
             </a:pPr>
             <a:r>
               <a:rPr lang="en-US" dirty="0"/>
-              <a:t>Password: adminpassword123</a:t>
+              <a:t>Password</a:t>
+            </a:r>
+            <a:r>
+              <a:rPr lang="en-US"/>
+              <a:t>: ####</a:t>
             </a:r>
             <a:endParaRPr dirty="0"/>
           </a:p>

</xml_diff>